<commit_message>
Final updates? to CTS-AMIA slides
</commit_message>
<xml_diff>
--- a/doc/presentations/20141107_NITRO-Competitions_CTS-AMIA.pptx
+++ b/doc/presentations/20141107_NITRO-Competitions_CTS-AMIA.pptx
@@ -8585,17 +8585,17 @@
           </a:prstGeom>
         </p:spPr>
         <p:style>
-          <a:lnRef idx="3">
-            <a:schemeClr val="lt1"/>
+          <a:lnRef idx="1">
+            <a:schemeClr val="dk1"/>
           </a:lnRef>
-          <a:fillRef idx="1">
+          <a:fillRef idx="2">
             <a:schemeClr val="dk1"/>
           </a:fillRef>
           <a:effectRef idx="1">
             <a:schemeClr val="dk1"/>
           </a:effectRef>
           <a:fontRef idx="minor">
-            <a:schemeClr val="lt1"/>
+            <a:schemeClr val="dk1"/>
           </a:fontRef>
         </p:style>
         <p:txBody>
@@ -8611,7 +8611,7 @@
                   </a:schemeClr>
                 </a:solidFill>
               </a:rPr>
-              <a:t>Oauth</a:t>
+              <a:t>OAuth</a:t>
             </a:r>
             <a:r>
               <a:rPr lang="en-US" sz="1200" i="1" dirty="0" smtClean="0">
@@ -8621,7 +8621,17 @@
                   </a:schemeClr>
                 </a:solidFill>
               </a:rPr>
-              <a:t> Provider</a:t>
+              <a:t> </a:t>
+            </a:r>
+            <a:r>
+              <a:rPr lang="en-US" sz="1200" i="1" dirty="0" smtClean="0">
+                <a:solidFill>
+                  <a:schemeClr val="bg1">
+                    <a:lumMod val="75000"/>
+                  </a:schemeClr>
+                </a:solidFill>
+              </a:rPr>
+              <a:t>Provider</a:t>
             </a:r>
             <a:endParaRPr lang="en-US" sz="1200" i="1" dirty="0">
               <a:solidFill>
@@ -10091,17 +10101,17 @@
           </a:prstGeom>
         </p:spPr>
         <p:style>
-          <a:lnRef idx="3">
-            <a:schemeClr val="lt1"/>
+          <a:lnRef idx="1">
+            <a:schemeClr val="dk1"/>
           </a:lnRef>
-          <a:fillRef idx="1">
+          <a:fillRef idx="2">
             <a:schemeClr val="dk1"/>
           </a:fillRef>
           <a:effectRef idx="1">
             <a:schemeClr val="dk1"/>
           </a:effectRef>
           <a:fontRef idx="minor">
-            <a:schemeClr val="lt1"/>
+            <a:schemeClr val="dk1"/>
           </a:fontRef>
         </p:style>
         <p:txBody>
@@ -10115,7 +10125,7 @@
                   <a:srgbClr val="BFBFBF"/>
                 </a:solidFill>
               </a:rPr>
-              <a:t>Oauth</a:t>
+              <a:t>OAuth</a:t>
             </a:r>
             <a:r>
               <a:rPr lang="en-US" sz="1200" i="1" dirty="0" smtClean="0">
@@ -10123,7 +10133,15 @@
                   <a:srgbClr val="BFBFBF"/>
                 </a:solidFill>
               </a:rPr>
-              <a:t> Provider</a:t>
+              <a:t> </a:t>
+            </a:r>
+            <a:r>
+              <a:rPr lang="en-US" sz="1200" i="1" dirty="0" smtClean="0">
+                <a:solidFill>
+                  <a:srgbClr val="BFBFBF"/>
+                </a:solidFill>
+              </a:rPr>
+              <a:t>Provider</a:t>
             </a:r>
             <a:endParaRPr lang="en-US" sz="1200" i="1" dirty="0">
               <a:solidFill>
@@ -11570,17 +11588,17 @@
           </a:prstGeom>
         </p:spPr>
         <p:style>
-          <a:lnRef idx="3">
-            <a:schemeClr val="lt1"/>
+          <a:lnRef idx="1">
+            <a:schemeClr val="dk1"/>
           </a:lnRef>
-          <a:fillRef idx="1">
+          <a:fillRef idx="2">
             <a:schemeClr val="dk1"/>
           </a:fillRef>
           <a:effectRef idx="1">
             <a:schemeClr val="dk1"/>
           </a:effectRef>
           <a:fontRef idx="minor">
-            <a:schemeClr val="lt1"/>
+            <a:schemeClr val="dk1"/>
           </a:fontRef>
         </p:style>
         <p:txBody>
@@ -11589,14 +11607,18 @@
           <a:p>
             <a:pPr algn="ctr"/>
             <a:r>
-              <a:rPr lang="en-US" sz="1200" b="1" dirty="0" err="1" smtClean="0"/>
-              <a:t>Oauth</a:t>
-            </a:r>
-            <a:r>
-              <a:rPr lang="en-US" sz="1200" b="1" dirty="0" smtClean="0"/>
-              <a:t> Provider</a:t>
-            </a:r>
-            <a:endParaRPr lang="en-US" sz="1200" b="1" dirty="0"/>
+              <a:rPr lang="en-US" sz="1200" b="1" i="1" dirty="0" err="1" smtClean="0"/>
+              <a:t>OAuth</a:t>
+            </a:r>
+            <a:r>
+              <a:rPr lang="en-US" sz="1200" b="1" i="1" dirty="0" smtClean="0"/>
+              <a:t> </a:t>
+            </a:r>
+            <a:r>
+              <a:rPr lang="en-US" sz="1200" b="1" i="1" dirty="0" smtClean="0"/>
+              <a:t>Provider</a:t>
+            </a:r>
+            <a:endParaRPr lang="en-US" sz="1200" b="1" i="1" dirty="0"/>
           </a:p>
         </p:txBody>
       </p:sp>
@@ -12151,7 +12173,23 @@
                   <a:srgbClr val="7F7F7F"/>
                 </a:solidFill>
               </a:rPr>
-              <a:t>NITRO-Competitions also handles various other legacy authentication mechanisms</a:t>
+              <a:t>NITRO-Competitions </a:t>
+            </a:r>
+            <a:r>
+              <a:rPr lang="en-US" sz="2000" dirty="0" smtClean="0">
+                <a:solidFill>
+                  <a:srgbClr val="7F7F7F"/>
+                </a:solidFill>
+              </a:rPr>
+              <a:t>supports </a:t>
+            </a:r>
+            <a:r>
+              <a:rPr lang="en-US" sz="2000" dirty="0" smtClean="0">
+                <a:solidFill>
+                  <a:srgbClr val="7F7F7F"/>
+                </a:solidFill>
+              </a:rPr>
+              <a:t>other legacy authentication mechanisms</a:t>
             </a:r>
           </a:p>
           <a:p>
@@ -12595,7 +12633,7 @@
             <a:pPr marL="0" indent="0" algn="ctr">
               <a:buNone/>
             </a:pPr>
-            <a:endParaRPr lang="en-US" dirty="0" smtClean="0"/>
+            <a:endParaRPr lang="en-US" sz="1200" dirty="0" smtClean="0"/>
           </a:p>
           <a:p>
             <a:r>
@@ -12607,22 +12645,44 @@
             <a:pPr lvl="1"/>
             <a:r>
               <a:rPr lang="en-US" sz="1800" dirty="0" smtClean="0"/>
-              <a:t>Sponsor Administrators</a:t>
-            </a:r>
+              <a:t>Sponsor </a:t>
+            </a:r>
+            <a:r>
+              <a:rPr lang="en-US" sz="1800" dirty="0" smtClean="0"/>
+              <a:t>Administrators </a:t>
+            </a:r>
+            <a:r>
+              <a:rPr lang="en-US" sz="1800" i="1" dirty="0" smtClean="0"/>
+              <a:t>(admin)</a:t>
+            </a:r>
+            <a:endParaRPr lang="en-US" sz="1800" dirty="0" smtClean="0"/>
           </a:p>
           <a:p>
             <a:pPr lvl="1"/>
             <a:r>
               <a:rPr lang="en-US" sz="1800" dirty="0" smtClean="0"/>
-              <a:t>Applicants</a:t>
-            </a:r>
+              <a:t>Applicants </a:t>
+            </a:r>
+            <a:r>
+              <a:rPr lang="en-US" sz="1800" i="1" dirty="0" smtClean="0"/>
+              <a:t>(user)</a:t>
+            </a:r>
+            <a:endParaRPr lang="en-US" sz="1800" dirty="0" smtClean="0"/>
           </a:p>
           <a:p>
             <a:pPr lvl="1"/>
             <a:r>
               <a:rPr lang="en-US" sz="1800" dirty="0" smtClean="0"/>
-              <a:t>Reviewers</a:t>
-            </a:r>
+              <a:t>Reviewers </a:t>
+            </a:r>
+            <a:r>
+              <a:rPr lang="en-US" sz="1800" i="1" dirty="0" smtClean="0"/>
+              <a:t>(reviewer)</a:t>
+            </a:r>
+          </a:p>
+          <a:p>
+            <a:pPr lvl="1"/>
+            <a:endParaRPr lang="en-US" sz="1800" dirty="0" smtClean="0"/>
           </a:p>
           <a:p>
             <a:r>
@@ -13216,7 +13276,7 @@
         </p:nvSpPr>
         <p:spPr>
           <a:xfrm>
-            <a:off x="3573518" y="2858838"/>
+            <a:off x="3745710" y="2858838"/>
             <a:ext cx="1532759" cy="627119"/>
           </a:xfrm>
           <a:prstGeom prst="roundRect">
@@ -13258,7 +13318,7 @@
         </p:nvSpPr>
         <p:spPr>
           <a:xfrm>
-            <a:off x="4983657" y="4713966"/>
+            <a:off x="5155849" y="4713966"/>
             <a:ext cx="1129144" cy="529027"/>
           </a:xfrm>
           <a:prstGeom prst="ellipse">
@@ -13300,7 +13360,7 @@
         </p:nvSpPr>
         <p:spPr>
           <a:xfrm>
-            <a:off x="3766213" y="4724426"/>
+            <a:off x="3938405" y="4724426"/>
             <a:ext cx="1129144" cy="529027"/>
           </a:xfrm>
           <a:prstGeom prst="ellipse">
@@ -13346,7 +13406,7 @@
         <p:spPr>
           <a:xfrm flipV="1">
             <a:off x="3053121" y="3172398"/>
-            <a:ext cx="520397" cy="1865588"/>
+            <a:ext cx="692589" cy="1865588"/>
           </a:xfrm>
           <a:prstGeom prst="bentConnector3">
             <a:avLst/>
@@ -13381,7 +13441,7 @@
         </p:nvCxnSpPr>
         <p:spPr>
           <a:xfrm flipH="1">
-            <a:off x="4330785" y="3485957"/>
+            <a:off x="4502977" y="3485957"/>
             <a:ext cx="9113" cy="1238469"/>
           </a:xfrm>
           <a:prstGeom prst="straightConnector1">
@@ -13417,7 +13477,7 @@
         </p:nvCxnSpPr>
         <p:spPr>
           <a:xfrm>
-            <a:off x="4339898" y="3485957"/>
+            <a:off x="4512090" y="3485957"/>
             <a:ext cx="1208331" cy="1228009"/>
           </a:xfrm>
           <a:prstGeom prst="straightConnector1">
@@ -13446,17 +13506,17 @@
         <p:nvCxnSpPr>
           <p:cNvPr id="46" name="Elbow Connector 45"/>
           <p:cNvCxnSpPr>
-            <a:stCxn id="31" idx="6"/>
+            <a:stCxn id="31" idx="7"/>
             <a:endCxn id="22" idx="1"/>
           </p:cNvCxnSpPr>
           <p:nvPr/>
         </p:nvCxnSpPr>
         <p:spPr>
-          <a:xfrm flipV="1">
-            <a:off x="6112801" y="3112838"/>
-            <a:ext cx="333549" cy="1865642"/>
-          </a:xfrm>
-          <a:prstGeom prst="bentConnector3">
+          <a:xfrm rot="5400000" flipH="1" flipV="1">
+            <a:off x="5443691" y="3788781"/>
+            <a:ext cx="1678602" cy="326716"/>
+          </a:xfrm>
+          <a:prstGeom prst="bentConnector2">
             <a:avLst/>
           </a:prstGeom>
           <a:ln>
@@ -13960,7 +14020,7 @@
             </a:pPr>
             <a:r>
               <a:rPr lang="en-US" sz="6000" dirty="0" smtClean="0"/>
-              <a:t>&lt;DEMO HERE&gt;</a:t>
+              <a:t>&lt; DEMO HERE /&gt;</a:t>
             </a:r>
             <a:endParaRPr lang="en-US" sz="6000" dirty="0"/>
           </a:p>
@@ -14093,7 +14153,7 @@
             <a:pPr marL="0" indent="0" algn="ctr">
               <a:buNone/>
             </a:pPr>
-            <a:endParaRPr lang="en-US" dirty="0"/>
+            <a:endParaRPr lang="en-US" sz="1200" dirty="0"/>
           </a:p>
           <a:p>
             <a:r>
@@ -14112,15 +14172,22 @@
             <a:pPr lvl="1"/>
             <a:r>
               <a:rPr lang="en-US" sz="2000" dirty="0" smtClean="0"/>
-              <a:t>Demo environment</a:t>
-            </a:r>
+              <a:t>Demo </a:t>
+            </a:r>
+            <a:r>
+              <a:rPr lang="en-US" sz="2000" dirty="0" smtClean="0"/>
+              <a:t>environment</a:t>
+            </a:r>
+          </a:p>
+          <a:p>
+            <a:pPr lvl="1"/>
+            <a:endParaRPr lang="en-US" sz="2000" dirty="0" smtClean="0"/>
           </a:p>
           <a:p>
             <a:r>
               <a:rPr lang="en-US" sz="2400" dirty="0" smtClean="0"/>
               <a:t>Anecdote 2 </a:t>
             </a:r>
-            <a:endParaRPr lang="en-US" sz="2400" dirty="0" smtClean="0"/>
           </a:p>
           <a:p>
             <a:pPr lvl="1"/>
@@ -14412,44 +14479,49 @@
             <a:endParaRPr lang="en-US" dirty="0"/>
           </a:p>
           <a:p>
-            <a:pPr marL="0" indent="0" algn="ctr">
-              <a:buNone/>
-            </a:pPr>
             <a:r>
               <a:rPr lang="en-US" sz="2800" dirty="0" smtClean="0"/>
-              <a:t>This application does not handle funds transfer</a:t>
-            </a:r>
-          </a:p>
-          <a:p>
-            <a:pPr marL="0" indent="0" algn="ctr">
-              <a:buNone/>
-            </a:pPr>
+              <a:t>At the </a:t>
+            </a:r>
+            <a:r>
+              <a:rPr lang="en-US" sz="2800" dirty="0" smtClean="0"/>
+              <a:t>end of the </a:t>
+            </a:r>
+            <a:r>
+              <a:rPr lang="en-US" sz="2800" dirty="0" smtClean="0"/>
+              <a:t>Review Period</a:t>
+            </a:r>
+          </a:p>
+          <a:p>
+            <a:r>
+              <a:rPr lang="en-US" sz="2800" dirty="0" smtClean="0"/>
+              <a:t>NITRO-Competitions </a:t>
+            </a:r>
+            <a:r>
+              <a:rPr lang="en-US" sz="2800" dirty="0" smtClean="0"/>
+              <a:t>does not handle funds </a:t>
+            </a:r>
+            <a:r>
+              <a:rPr lang="en-US" sz="2800" dirty="0" smtClean="0"/>
+              <a:t>transfer</a:t>
+            </a:r>
             <a:endParaRPr lang="en-US" sz="2800" dirty="0"/>
           </a:p>
           <a:p>
-            <a:pPr marL="0" indent="0" algn="ctr">
-              <a:buNone/>
-            </a:pPr>
             <a:r>
               <a:rPr lang="en-US" sz="2800" dirty="0" smtClean="0"/>
-              <a:t>NU-</a:t>
-            </a:r>
-            <a:r>
-              <a:rPr lang="en-US" sz="2800" dirty="0" smtClean="0"/>
-              <a:t>Core</a:t>
-            </a:r>
-          </a:p>
-          <a:p>
-            <a:pPr marL="0" indent="0" algn="ctr">
-              <a:buNone/>
-            </a:pPr>
-            <a:r>
-              <a:rPr lang="en-US" sz="2800" u="sng" dirty="0">
+              <a:t>NU-Core</a:t>
+            </a:r>
+          </a:p>
+          <a:p>
+            <a:pPr lvl="1"/>
+            <a:r>
+              <a:rPr lang="en-US" sz="2400" u="sng" dirty="0">
                 <a:hlinkClick r:id="rId2"/>
               </a:rPr>
               <a:t>https://github.com/tablexi/nucore-open</a:t>
             </a:r>
-            <a:endParaRPr lang="en-US" sz="2800" dirty="0" smtClean="0"/>
+            <a:endParaRPr lang="en-US" sz="2400" dirty="0" smtClean="0"/>
           </a:p>
           <a:p>
             <a:pPr marL="0" indent="0" algn="ctr">
@@ -20995,7 +21067,7 @@
                 <a:latin typeface="Calibri"/>
                 <a:ea typeface="+mn-ea"/>
               </a:rPr>
-              <a:t>Kyako</a:t>
+              <a:t>Kayako</a:t>
             </a:r>
             <a:r>
               <a:rPr lang="en-US" sz="1050" b="1" dirty="0" smtClean="0">
@@ -21005,7 +21077,17 @@
                 <a:latin typeface="Calibri"/>
                 <a:ea typeface="+mn-ea"/>
               </a:rPr>
-              <a:t> Ticket Tracking</a:t>
+              <a:t> </a:t>
+            </a:r>
+            <a:r>
+              <a:rPr lang="en-US" sz="1050" b="1" dirty="0" smtClean="0">
+                <a:solidFill>
+                  <a:prstClr val="black"/>
+                </a:solidFill>
+                <a:latin typeface="Calibri"/>
+                <a:ea typeface="+mn-ea"/>
+              </a:rPr>
+              <a:t>Ticket Tracking</a:t>
             </a:r>
             <a:endParaRPr lang="en-US" sz="1050" b="1" dirty="0">
               <a:solidFill>
@@ -22022,7 +22104,15 @@
             </a:r>
             <a:r>
               <a:rPr lang="en-US" b="1" dirty="0" smtClean="0"/>
-              <a:t>and Review,</a:t>
+              <a:t>and </a:t>
+            </a:r>
+            <a:r>
+              <a:rPr lang="en-US" b="1" dirty="0" smtClean="0"/>
+              <a:t>Review</a:t>
+            </a:r>
+            <a:r>
+              <a:rPr lang="en-US" b="1" dirty="0" smtClean="0"/>
+              <a:t/>
             </a:r>
             <a:br>
               <a:rPr lang="en-US" b="1" dirty="0" smtClean="0"/>
@@ -22258,7 +22348,15 @@
             </a:pPr>
             <a:r>
               <a:rPr lang="en-US" dirty="0" smtClean="0"/>
-              <a:t>The funding competition workflow styled after the NIH </a:t>
+              <a:t>The funding competition workflow </a:t>
+            </a:r>
+            <a:r>
+              <a:rPr lang="en-US" dirty="0" smtClean="0"/>
+              <a:t>is styled </a:t>
+            </a:r>
+            <a:r>
+              <a:rPr lang="en-US" dirty="0" smtClean="0"/>
+              <a:t>after the NIH </a:t>
             </a:r>
             <a:r>
               <a:rPr lang="en-US" dirty="0" err="1" smtClean="0"/>
@@ -22492,7 +22590,10 @@
             </a:r>
           </a:p>
           <a:p>
-            <a:endParaRPr lang="en-US" sz="1800" dirty="0"/>
+            <a:pPr marL="0" indent="0">
+              <a:buNone/>
+            </a:pPr>
+            <a:endParaRPr lang="en-US" sz="1800" dirty="0" smtClean="0"/>
           </a:p>
         </p:txBody>
       </p:sp>
@@ -23672,17 +23773,17 @@
           </a:prstGeom>
         </p:spPr>
         <p:style>
-          <a:lnRef idx="3">
-            <a:schemeClr val="lt1"/>
+          <a:lnRef idx="1">
+            <a:schemeClr val="dk1"/>
           </a:lnRef>
-          <a:fillRef idx="1">
+          <a:fillRef idx="2">
             <a:schemeClr val="dk1"/>
           </a:fillRef>
           <a:effectRef idx="1">
             <a:schemeClr val="dk1"/>
           </a:effectRef>
           <a:fontRef idx="minor">
-            <a:schemeClr val="lt1"/>
+            <a:schemeClr val="dk1"/>
           </a:fontRef>
         </p:style>
         <p:txBody>
@@ -23691,14 +23792,18 @@
           <a:p>
             <a:pPr algn="ctr"/>
             <a:r>
-              <a:rPr lang="en-US" sz="1200" dirty="0" err="1" smtClean="0"/>
-              <a:t>Oauth</a:t>
-            </a:r>
-            <a:r>
-              <a:rPr lang="en-US" sz="1200" dirty="0" smtClean="0"/>
-              <a:t> Provider</a:t>
-            </a:r>
-            <a:endParaRPr lang="en-US" sz="1200" dirty="0"/>
+              <a:rPr lang="en-US" sz="1200" i="1" dirty="0" err="1" smtClean="0"/>
+              <a:t>OAuth</a:t>
+            </a:r>
+            <a:r>
+              <a:rPr lang="en-US" sz="1200" i="1" dirty="0" smtClean="0"/>
+              <a:t> </a:t>
+            </a:r>
+            <a:r>
+              <a:rPr lang="en-US" sz="1200" i="1" dirty="0" smtClean="0"/>
+              <a:t>Provider</a:t>
+            </a:r>
+            <a:endParaRPr lang="en-US" sz="1200" i="1" dirty="0"/>
           </a:p>
         </p:txBody>
       </p:sp>

</xml_diff>